<commit_message>
ders 2 slaytlar materyaller
</commit_message>
<xml_diff>
--- a/dersler/Ders 1 - Giriş.pptx
+++ b/dersler/Ders 1 - Giriş.pptx
@@ -301,7 +301,7 @@
             <a:fld id="{CB44B6B1-5441-9644-AE1C-BB7EA5DBA264}" type="datetimeFigureOut">
               <a:rPr lang="en-US" smtClean="0"/>
               <a:pPr/>
-              <a:t>3/6/2021</a:t>
+              <a:t>3/13/2021</a:t>
             </a:fld>
             <a:endParaRPr lang="en-US"/>
           </a:p>
@@ -464,7 +464,7 @@
             <a:fld id="{41878819-472C-A14B-95BF-39C94BA106B2}" type="datetimeFigureOut">
               <a:rPr lang="en-US" smtClean="0"/>
               <a:pPr/>
-              <a:t>3/6/2021</a:t>
+              <a:t>3/13/2021</a:t>
             </a:fld>
             <a:endParaRPr lang="en-US"/>
           </a:p>
@@ -2084,7 +2084,7 @@
               <a:pPr>
                 <a:defRPr/>
               </a:pPr>
-              <a:t>3/6/2021</a:t>
+              <a:t>3/13/2021</a:t>
             </a:fld>
             <a:endParaRPr lang="en-US"/>
           </a:p>
@@ -2296,7 +2296,7 @@
               <a:pPr>
                 <a:defRPr/>
               </a:pPr>
-              <a:t>3/6/2021</a:t>
+              <a:t>3/13/2021</a:t>
             </a:fld>
             <a:endParaRPr lang="en-US"/>
           </a:p>
@@ -2513,7 +2513,7 @@
               <a:pPr>
                 <a:defRPr/>
               </a:pPr>
-              <a:t>3/6/2021</a:t>
+              <a:t>3/13/2021</a:t>
             </a:fld>
             <a:endParaRPr lang="en-US"/>
           </a:p>
@@ -2980,7 +2980,7 @@
               <a:pPr>
                 <a:defRPr/>
               </a:pPr>
-              <a:t>3/6/2021</a:t>
+              <a:t>3/13/2021</a:t>
             </a:fld>
             <a:endParaRPr lang="en-US"/>
           </a:p>
@@ -3263,7 +3263,7 @@
               <a:pPr>
                 <a:defRPr/>
               </a:pPr>
-              <a:t>3/6/2021</a:t>
+              <a:t>3/13/2021</a:t>
             </a:fld>
             <a:endParaRPr lang="en-US"/>
           </a:p>
@@ -3591,7 +3591,7 @@
               <a:pPr>
                 <a:defRPr/>
               </a:pPr>
-              <a:t>3/6/2021</a:t>
+              <a:t>3/13/2021</a:t>
             </a:fld>
             <a:endParaRPr lang="en-US"/>
           </a:p>
@@ -4059,7 +4059,7 @@
               <a:pPr>
                 <a:defRPr/>
               </a:pPr>
-              <a:t>3/6/2021</a:t>
+              <a:t>3/13/2021</a:t>
             </a:fld>
             <a:endParaRPr lang="en-US"/>
           </a:p>
@@ -4211,7 +4211,7 @@
               <a:pPr>
                 <a:defRPr/>
               </a:pPr>
-              <a:t>3/6/2021</a:t>
+              <a:t>3/13/2021</a:t>
             </a:fld>
             <a:endParaRPr lang="en-US"/>
           </a:p>
@@ -4340,7 +4340,7 @@
               <a:pPr>
                 <a:defRPr/>
               </a:pPr>
-              <a:t>3/6/2021</a:t>
+              <a:t>3/13/2021</a:t>
             </a:fld>
             <a:endParaRPr lang="en-US"/>
           </a:p>
@@ -4657,7 +4657,7 @@
               <a:pPr>
                 <a:defRPr/>
               </a:pPr>
-              <a:t>3/6/2021</a:t>
+              <a:t>3/13/2021</a:t>
             </a:fld>
             <a:endParaRPr lang="en-US"/>
           </a:p>
@@ -4955,7 +4955,7 @@
               <a:pPr>
                 <a:defRPr/>
               </a:pPr>
-              <a:t>3/6/2021</a:t>
+              <a:t>3/13/2021</a:t>
             </a:fld>
             <a:endParaRPr lang="en-US"/>
           </a:p>
@@ -5155,7 +5155,7 @@
               <a:pPr>
                 <a:defRPr/>
               </a:pPr>
-              <a:t>3/6/2021</a:t>
+              <a:t>3/13/2021</a:t>
             </a:fld>
             <a:endParaRPr lang="en-US"/>
           </a:p>
@@ -6323,17 +6323,7 @@
                 <a:latin typeface="Arial"/>
                 <a:cs typeface="Arial"/>
               </a:rPr>
-              <a:t> </a:t>
-            </a:r>
-            <a:r>
-              <a:rPr lang="en-US" sz="4400" spc="-265" dirty="0" smtClean="0">
-                <a:solidFill>
-                  <a:srgbClr val="000000"/>
-                </a:solidFill>
-                <a:latin typeface="Arial"/>
-                <a:cs typeface="Arial"/>
-              </a:rPr>
-              <a:t>– </a:t>
+              <a:t> – </a:t>
             </a:r>
             <a:r>
               <a:rPr lang="tr-TR" sz="4400" spc="-265" dirty="0" smtClean="0">
@@ -6409,17 +6399,7 @@
                 <a:latin typeface="Courier New" panose="02070309020205020404" pitchFamily="49" charset="0"/>
                 <a:cs typeface="Courier New" panose="02070309020205020404" pitchFamily="49" charset="0"/>
               </a:rPr>
-              <a:t> </a:t>
-            </a:r>
-            <a:r>
-              <a:rPr lang="en-US" sz="3600" spc="-265" dirty="0" smtClean="0">
-                <a:solidFill>
-                  <a:srgbClr val="000000"/>
-                </a:solidFill>
-                <a:latin typeface="Courier New" panose="02070309020205020404" pitchFamily="49" charset="0"/>
-                <a:cs typeface="Courier New" panose="02070309020205020404" pitchFamily="49" charset="0"/>
-              </a:rPr>
-              <a:t>University</a:t>
+              <a:t> University</a:t>
             </a:r>
             <a:br>
               <a:rPr lang="en-US" sz="3600" spc="-265" dirty="0" smtClean="0">
@@ -7781,7 +7761,6 @@
               <a:rPr lang="en-GB" dirty="0" smtClean="0"/>
               <a:t> </a:t>
             </a:r>
-            <a:endParaRPr lang="en-GB" dirty="0" smtClean="0"/>
           </a:p>
           <a:p>
             <a:pPr lvl="1" algn="just"/>
@@ -7824,7 +7803,6 @@
               <a:rPr lang="en-GB" i="1" dirty="0" smtClean="0"/>
               <a:t> </a:t>
             </a:r>
-            <a:endParaRPr lang="en-GB" i="1" dirty="0" smtClean="0"/>
           </a:p>
           <a:p>
             <a:pPr lvl="1" algn="just"/>
@@ -8315,7 +8293,6 @@
               <a:rPr lang="en-GB" dirty="0" smtClean="0"/>
               <a:t> </a:t>
             </a:r>
-            <a:endParaRPr lang="en-GB" dirty="0" smtClean="0"/>
           </a:p>
           <a:p>
             <a:pPr lvl="1" algn="just"/>
@@ -9676,8 +9653,24 @@
           <a:lstStyle/>
           <a:p>
             <a:r>
+              <a:rPr lang="en-US" sz="3200" dirty="0" err="1" smtClean="0"/>
+              <a:t>Ders</a:t>
+            </a:r>
+            <a:r>
+              <a:rPr lang="en-US" sz="3200" dirty="0" smtClean="0"/>
+              <a:t> 1’de </a:t>
+            </a:r>
+            <a:r>
+              <a:rPr lang="en-US" sz="3200" dirty="0" err="1" smtClean="0"/>
+              <a:t>İşlenen</a:t>
+            </a:r>
+            <a:r>
               <a:rPr lang="tr-TR" sz="3200" dirty="0" smtClean="0"/>
-              <a:t>İşlenmiş Konular</a:t>
+              <a:t> </a:t>
+            </a:r>
+            <a:r>
+              <a:rPr lang="tr-TR" sz="3200" dirty="0" smtClean="0"/>
+              <a:t>Konular</a:t>
             </a:r>
             <a:endParaRPr lang="tr-TR" sz="3200" dirty="0"/>
           </a:p>
@@ -9703,7 +9696,6 @@
               <a:rPr lang="tr-TR" sz="2800" dirty="0" smtClean="0"/>
               <a:t>Profesyonel yazılım geliştirme</a:t>
             </a:r>
-            <a:endParaRPr lang="tr-TR" sz="2800" dirty="0" smtClean="0"/>
           </a:p>
           <a:p>
             <a:pPr lvl="1" algn="just"/>
@@ -9711,7 +9703,6 @@
               <a:rPr lang="tr-TR" sz="2400" dirty="0" smtClean="0"/>
               <a:t>Yazılım mühendisliği ile ne kastedilmektedir.</a:t>
             </a:r>
-            <a:endParaRPr lang="tr-TR" sz="2400" dirty="0" smtClean="0"/>
           </a:p>
           <a:p>
             <a:pPr algn="just"/>
@@ -9719,7 +9710,6 @@
               <a:rPr lang="tr-TR" sz="2800" dirty="0" smtClean="0"/>
               <a:t>Yazılım mühendisliği etiği</a:t>
             </a:r>
-            <a:endParaRPr lang="tr-TR" sz="2800" dirty="0" smtClean="0"/>
           </a:p>
           <a:p>
             <a:pPr lvl="1" algn="just"/>
@@ -9727,7 +9717,6 @@
               <a:rPr lang="tr-TR" sz="2400" dirty="0" smtClean="0"/>
               <a:t>Yazılım mühendisliğini etkileyen etik konulara kısa bir giriş.</a:t>
             </a:r>
-            <a:endParaRPr lang="tr-TR" sz="2400" dirty="0" smtClean="0"/>
           </a:p>
           <a:p>
             <a:pPr algn="just"/>
@@ -9735,7 +9724,6 @@
               <a:rPr lang="tr-TR" sz="2800" dirty="0" smtClean="0"/>
               <a:t>Durum çalışmaları</a:t>
             </a:r>
-            <a:endParaRPr lang="tr-TR" sz="2800" dirty="0" smtClean="0"/>
           </a:p>
           <a:p>
             <a:pPr lvl="1" algn="just"/>
@@ -12984,7 +12972,6 @@
               <a:rPr lang="tr-TR" sz="2800" dirty="0" smtClean="0"/>
               <a:t>Etik İlkeler</a:t>
             </a:r>
-            <a:endParaRPr lang="tr-TR" sz="2800" dirty="0" smtClean="0"/>
           </a:p>
         </p:txBody>
       </p:sp>
@@ -13654,7 +13641,6 @@
               <a:rPr lang="tr-TR" sz="2800" dirty="0" smtClean="0"/>
               <a:t>İnsülin Pompası Donanım Mimarisi</a:t>
             </a:r>
-            <a:endParaRPr lang="tr-TR" sz="2800" dirty="0" smtClean="0"/>
           </a:p>
         </p:txBody>
       </p:sp>
@@ -13730,7 +13716,7 @@
           <p:nvPr/>
         </p:nvPicPr>
         <mc:AlternateContent xmlns:mc="http://schemas.openxmlformats.org/markup-compatibility/2006">
-          <mc:Choice xmlns:ma="http://schemas.microsoft.com/office/mac/drawingml/2008/main" xmlns:mv="urn:schemas-microsoft-com:mac:vml" xmlns="" Requires="ma">
+          <mc:Choice xmlns="" xmlns:mv="urn:schemas-microsoft-com:mac:vml" xmlns:ma="http://schemas.microsoft.com/office/mac/drawingml/2008/main" Requires="ma">
             <p:blipFill>
               <a:blip r:embed="rId2"/>
               <a:stretch>
@@ -13832,7 +13818,6 @@
               <a:rPr lang="tr-TR" sz="2800" dirty="0" smtClean="0"/>
               <a:t>İnsülin Pompasının Aktivite Modeli</a:t>
             </a:r>
-            <a:endParaRPr lang="tr-TR" sz="2800" dirty="0" smtClean="0"/>
           </a:p>
         </p:txBody>
       </p:sp>
@@ -13908,7 +13893,7 @@
           <p:nvPr/>
         </p:nvPicPr>
         <mc:AlternateContent xmlns:mc="http://schemas.openxmlformats.org/markup-compatibility/2006">
-          <mc:Choice xmlns:ma="http://schemas.microsoft.com/office/mac/drawingml/2008/main" xmlns:mv="urn:schemas-microsoft-com:mac:vml" xmlns="" Requires="ma">
+          <mc:Choice xmlns="" xmlns:mv="urn:schemas-microsoft-com:mac:vml" xmlns:ma="http://schemas.microsoft.com/office/mac/drawingml/2008/main" Requires="ma">
             <p:blipFill>
               <a:blip r:embed="rId2"/>
               <a:stretch>
@@ -14032,15 +14017,7 @@
             <a:pPr algn="just"/>
             <a:r>
               <a:rPr lang="tr-TR" sz="2800" dirty="0" smtClean="0"/>
-              <a:t>Sistem, </a:t>
-            </a:r>
-            <a:r>
-              <a:rPr lang="tr-TR" sz="2800" dirty="0" smtClean="0"/>
-              <a:t>gerektiğinde </a:t>
-            </a:r>
-            <a:r>
-              <a:rPr lang="tr-TR" sz="2800" dirty="0" smtClean="0"/>
-              <a:t>insülin verebilecek durumda olacaktır.</a:t>
+              <a:t>Sistem, gerektiğinde insülin verebilecek durumda olacaktır.</a:t>
             </a:r>
           </a:p>
           <a:p>
@@ -14615,11 +14592,7 @@
           <a:p>
             <a:r>
               <a:rPr lang="tr-TR" sz="2800" dirty="0" smtClean="0"/>
-              <a:t>AS-HYS </a:t>
-            </a:r>
-            <a:r>
-              <a:rPr lang="tr-TR" sz="2800" dirty="0" smtClean="0"/>
-              <a:t>Hedefleri</a:t>
+              <a:t>AS-HYS Hedefleri</a:t>
             </a:r>
             <a:endParaRPr lang="tr-TR" sz="2800" dirty="0"/>
           </a:p>
@@ -14772,13 +14745,8 @@
             </a:r>
             <a:r>
               <a:rPr lang="tr-TR" dirty="0" smtClean="0"/>
-              <a:t> </a:t>
-            </a:r>
-            <a:r>
-              <a:rPr lang="tr-TR" dirty="0" smtClean="0"/>
-              <a:t>Organizasyonu</a:t>
-            </a:r>
-            <a:endParaRPr lang="tr-TR" dirty="0" smtClean="0"/>
+              <a:t> Organizasyonu</a:t>
+            </a:r>
           </a:p>
         </p:txBody>
       </p:sp>
@@ -14854,7 +14822,7 @@
           <p:nvPr/>
         </p:nvPicPr>
         <mc:AlternateContent xmlns:mc="http://schemas.openxmlformats.org/markup-compatibility/2006">
-          <mc:Choice xmlns:ma="http://schemas.microsoft.com/office/mac/drawingml/2008/main" xmlns:mv="urn:schemas-microsoft-com:mac:vml" xmlns="" Requires="ma">
+          <mc:Choice xmlns="" xmlns:mv="urn:schemas-microsoft-com:mac:vml" xmlns:ma="http://schemas.microsoft.com/office/mac/drawingml/2008/main" Requires="ma">
             <p:blipFill>
               <a:blip r:embed="rId2"/>
               <a:stretch>
@@ -15149,11 +15117,7 @@
             </a:r>
             <a:r>
               <a:rPr lang="tr-TR" sz="2800" dirty="0" smtClean="0"/>
-              <a:t> </a:t>
-            </a:r>
-            <a:r>
-              <a:rPr lang="tr-TR" sz="2800" dirty="0" smtClean="0"/>
-              <a:t>Endişeleri</a:t>
+              <a:t> Endişeleri</a:t>
             </a:r>
             <a:endParaRPr lang="tr-TR" sz="2800" dirty="0"/>
           </a:p>
@@ -15320,11 +15284,7 @@
           <a:p>
             <a:r>
               <a:rPr lang="tr-TR" sz="2800" dirty="0" smtClean="0"/>
-              <a:t>Doğa </a:t>
-            </a:r>
-            <a:r>
-              <a:rPr lang="tr-TR" sz="2800" dirty="0" smtClean="0"/>
-              <a:t>Hava </a:t>
+              <a:t>Doğa Hava </a:t>
             </a:r>
             <a:r>
               <a:rPr lang="tr-TR" sz="2800" dirty="0"/>
@@ -15494,7 +15454,6 @@
               <a:rPr lang="tr-TR" sz="2800" dirty="0" smtClean="0"/>
               <a:t>Hava Durumu İstasyonunun Çevresi</a:t>
             </a:r>
-            <a:endParaRPr lang="tr-TR" sz="2800" dirty="0" smtClean="0"/>
           </a:p>
         </p:txBody>
       </p:sp>
@@ -15570,7 +15529,7 @@
           <p:nvPr/>
         </p:nvPicPr>
         <mc:AlternateContent xmlns:mc="http://schemas.openxmlformats.org/markup-compatibility/2006">
-          <mc:Choice xmlns:ma="http://schemas.microsoft.com/office/mac/drawingml/2008/main" xmlns:mv="urn:schemas-microsoft-com:mac:vml" xmlns="" Requires="ma">
+          <mc:Choice xmlns="" xmlns:mv="urn:schemas-microsoft-com:mac:vml" xmlns:ma="http://schemas.microsoft.com/office/mac/drawingml/2008/main" Requires="ma">
             <p:blipFill>
               <a:blip r:embed="rId2"/>
               <a:stretch>

</xml_diff>